<commit_message>
Update academia and tab tasks
</commit_message>
<xml_diff>
--- a/SE-611/Academia Slides-Books/Lecture#2.pptx
+++ b/SE-611/Academia Slides-Books/Lecture#2.pptx
@@ -4492,12 +4492,18 @@
             </a:pPr>
             <a:r>
               <a:rPr lang="en-US" dirty="0" smtClean="0">
+                <a:highlight>
+                  <a:srgbClr val="FFFF00"/>
+                </a:highlight>
                 <a:latin typeface="Times New Roman" panose="02020503050405090304" pitchFamily="18" charset="0"/>
                 <a:cs typeface="Times New Roman" panose="02020503050405090304" pitchFamily="18" charset="0"/>
               </a:rPr>
               <a:t>The real world is the domain and the mathematical world is the range</a:t>
             </a:r>
             <a:endParaRPr lang="en-US" dirty="0" smtClean="0">
+              <a:highlight>
+                <a:srgbClr val="FFFF00"/>
+              </a:highlight>
               <a:latin typeface="Times New Roman" panose="02020503050405090304" pitchFamily="18" charset="0"/>
               <a:cs typeface="Times New Roman" panose="02020503050405090304" pitchFamily="18" charset="0"/>
             </a:endParaRPr>
@@ -5693,10 +5699,20 @@
             </a:r>
             <a:r>
               <a:rPr lang="en-US" dirty="0" smtClean="0">
-                <a:latin typeface="Times New Roman" panose="02020503050405090304" pitchFamily="18" charset="0"/>
-                <a:cs typeface="Times New Roman" panose="02020503050405090304" pitchFamily="18" charset="0"/>
-              </a:rPr>
-              <a:t>Three important questions concerning representation and scales:</a:t>
+                <a:highlight>
+                  <a:srgbClr val="FFFF00"/>
+                </a:highlight>
+                <a:latin typeface="Times New Roman" panose="02020503050405090304" pitchFamily="18" charset="0"/>
+                <a:cs typeface="Times New Roman" panose="02020503050405090304" pitchFamily="18" charset="0"/>
+              </a:rPr>
+              <a:t>Three important questions</a:t>
+            </a:r>
+            <a:r>
+              <a:rPr lang="en-US" dirty="0" smtClean="0">
+                <a:latin typeface="Times New Roman" panose="02020503050405090304" pitchFamily="18" charset="0"/>
+                <a:cs typeface="Times New Roman" panose="02020503050405090304" pitchFamily="18" charset="0"/>
+              </a:rPr>
+              <a:t> concerning representation and scales:</a:t>
             </a:r>
             <a:endParaRPr lang="en-US" dirty="0" smtClean="0">
               <a:latin typeface="Times New Roman" panose="02020503050405090304" pitchFamily="18" charset="0"/>
@@ -6167,10 +6183,23 @@
                 <a:latin typeface="Times New Roman" panose="02020503050405090304" pitchFamily="18" charset="0"/>
                 <a:cs typeface="Times New Roman" panose="02020503050405090304" pitchFamily="18" charset="0"/>
               </a:rPr>
-              <a:t>. The empirical relation system consists only of different classes; there is no notion of ordering among the classes</a:t>
+              <a:t>. The empirical relation system consists only of different classes; there is </a:t>
+            </a:r>
+            <a:r>
+              <a:rPr lang="en-US" dirty="0">
+                <a:highlight>
+                  <a:srgbClr val="FFFF00"/>
+                </a:highlight>
+                <a:latin typeface="Times New Roman" panose="02020503050405090304" pitchFamily="18" charset="0"/>
+                <a:cs typeface="Times New Roman" panose="02020503050405090304" pitchFamily="18" charset="0"/>
+              </a:rPr>
+              <a:t>no notion of ordering among the classes</a:t>
             </a:r>
             <a:r>
               <a:rPr lang="en-US" dirty="0" smtClean="0">
+                <a:highlight>
+                  <a:srgbClr val="FFFF00"/>
+                </a:highlight>
                 <a:latin typeface="Times New Roman" panose="02020503050405090304" pitchFamily="18" charset="0"/>
                 <a:cs typeface="Times New Roman" panose="02020503050405090304" pitchFamily="18" charset="0"/>
               </a:rPr>
@@ -6198,9 +6227,22 @@
                 <a:latin typeface="Times New Roman" panose="02020503050405090304" pitchFamily="18" charset="0"/>
                 <a:cs typeface="Times New Roman" panose="02020503050405090304" pitchFamily="18" charset="0"/>
               </a:rPr>
-              <a:t>. Any distinct numbering or symbolic representation of the classes is an acceptable measure </a:t>
+              <a:t>. </a:t>
+            </a:r>
+            <a:r>
+              <a:rPr lang="en-US" dirty="0">
+                <a:highlight>
+                  <a:srgbClr val="FFFF00"/>
+                </a:highlight>
+                <a:latin typeface="Times New Roman" panose="02020503050405090304" pitchFamily="18" charset="0"/>
+                <a:cs typeface="Times New Roman" panose="02020503050405090304" pitchFamily="18" charset="0"/>
+              </a:rPr>
+              <a:t>Any distinct numbering or symbolic representation of the classes is an acceptable measure </a:t>
             </a:r>
             <a:endParaRPr lang="en-US" dirty="0">
+              <a:highlight>
+                <a:srgbClr val="FFFF00"/>
+              </a:highlight>
               <a:latin typeface="Times New Roman" panose="02020503050405090304" pitchFamily="18" charset="0"/>
               <a:cs typeface="Times New Roman" panose="02020503050405090304" pitchFamily="18" charset="0"/>
             </a:endParaRPr>
@@ -6211,6 +6253,9 @@
               <a:buChar char="§"/>
             </a:pPr>
             <a:endParaRPr lang="en-US" sz="2000" dirty="0">
+              <a:highlight>
+                <a:srgbClr val="FFFF00"/>
+              </a:highlight>
               <a:latin typeface="Times New Roman" panose="02020503050405090304" pitchFamily="18" charset="0"/>
               <a:cs typeface="Times New Roman" panose="02020503050405090304" pitchFamily="18" charset="0"/>
             </a:endParaRPr>
@@ -7079,6 +7124,9 @@
             </a:r>
             <a:r>
               <a:rPr lang="en-US" dirty="0">
+                <a:highlight>
+                  <a:srgbClr val="FFFF00"/>
+                </a:highlight>
                 <a:latin typeface="Times New Roman" panose="02020503050405090304" pitchFamily="18" charset="0"/>
                 <a:cs typeface="Times New Roman" panose="02020503050405090304" pitchFamily="18" charset="0"/>
               </a:rPr>
@@ -7086,12 +7134,18 @@
             </a:r>
             <a:r>
               <a:rPr lang="en-US" dirty="0" smtClean="0">
+                <a:highlight>
+                  <a:srgbClr val="FFFF00"/>
+                </a:highlight>
                 <a:latin typeface="Times New Roman" panose="02020503050405090304" pitchFamily="18" charset="0"/>
                 <a:cs typeface="Times New Roman" panose="02020503050405090304" pitchFamily="18" charset="0"/>
               </a:rPr>
               <a:t>.</a:t>
             </a:r>
-            <a:endParaRPr lang="en-US" dirty="0">
+            <a:endParaRPr lang="en-US" dirty="0" smtClean="0">
+              <a:highlight>
+                <a:srgbClr val="FFFF00"/>
+              </a:highlight>
               <a:latin typeface="Times New Roman" panose="02020503050405090304" pitchFamily="18" charset="0"/>
               <a:cs typeface="Times New Roman" panose="02020503050405090304" pitchFamily="18" charset="0"/>
             </a:endParaRPr>
@@ -7418,7 +7472,24 @@
                 <a:latin typeface="Times New Roman" panose="02020503050405090304" pitchFamily="18" charset="0"/>
                 <a:cs typeface="Times New Roman" panose="02020503050405090304" pitchFamily="18" charset="0"/>
               </a:rPr>
-              <a:t>it more powerful than nominal or ordinal. This scale captures information about the size of the intervals that separate the classes, so that we can in some sense understand the size of the jump from one class to another. </a:t>
+              <a:t>it more powerful than nominal or ordinal. This scale </a:t>
+            </a:r>
+            <a:r>
+              <a:rPr lang="en-US" sz="2900" dirty="0">
+                <a:highlight>
+                  <a:srgbClr val="FFFF00"/>
+                </a:highlight>
+                <a:latin typeface="Times New Roman" panose="02020503050405090304" pitchFamily="18" charset="0"/>
+                <a:cs typeface="Times New Roman" panose="02020503050405090304" pitchFamily="18" charset="0"/>
+              </a:rPr>
+              <a:t>captures information about the size of the intervals</a:t>
+            </a:r>
+            <a:r>
+              <a:rPr lang="en-US" sz="2900" dirty="0">
+                <a:latin typeface="Times New Roman" panose="02020503050405090304" pitchFamily="18" charset="0"/>
+                <a:cs typeface="Times New Roman" panose="02020503050405090304" pitchFamily="18" charset="0"/>
+              </a:rPr>
+              <a:t> that separate the classes, so that we can in some sense understand the size of the jump from one class to another. </a:t>
             </a:r>
             <a:endParaRPr lang="en-US" sz="2900" dirty="0">
               <a:latin typeface="Times New Roman" panose="02020503050405090304" pitchFamily="18" charset="0"/>
@@ -7456,6 +7527,9 @@
             </a:pPr>
             <a:r>
               <a:rPr lang="en-US" sz="2900" dirty="0" smtClean="0">
+                <a:highlight>
+                  <a:srgbClr val="FFFF00"/>
+                </a:highlight>
                 <a:latin typeface="Times New Roman" panose="02020503050405090304" pitchFamily="18" charset="0"/>
                 <a:cs typeface="Times New Roman" panose="02020503050405090304" pitchFamily="18" charset="0"/>
               </a:rPr>
@@ -7463,10 +7537,20 @@
             </a:r>
             <a:r>
               <a:rPr lang="en-US" sz="2900" dirty="0">
-                <a:latin typeface="Times New Roman" panose="02020503050405090304" pitchFamily="18" charset="0"/>
-                <a:cs typeface="Times New Roman" panose="02020503050405090304" pitchFamily="18" charset="0"/>
-              </a:rPr>
-              <a:t>interval scale preserves differences but not ratios. That is, we know the difference between any two of the ordered classes in the range of the mapping, but computing the ratio of two classes in the range does not make sense.</a:t>
+                <a:highlight>
+                  <a:srgbClr val="FFFF00"/>
+                </a:highlight>
+                <a:latin typeface="Times New Roman" panose="02020503050405090304" pitchFamily="18" charset="0"/>
+                <a:cs typeface="Times New Roman" panose="02020503050405090304" pitchFamily="18" charset="0"/>
+              </a:rPr>
+              <a:t>interval scale preserves differences but not ratios.</a:t>
+            </a:r>
+            <a:r>
+              <a:rPr lang="en-US" sz="2900" dirty="0">
+                <a:latin typeface="Times New Roman" panose="02020503050405090304" pitchFamily="18" charset="0"/>
+                <a:cs typeface="Times New Roman" panose="02020503050405090304" pitchFamily="18" charset="0"/>
+              </a:rPr>
+              <a:t> That is, we know the difference between any two of the ordered classes in the range of the mapping, but computing the ratio of two classes in the range does not make sense.</a:t>
             </a:r>
             <a:endParaRPr lang="en-US" sz="2900" dirty="0">
               <a:latin typeface="Times New Roman" panose="02020503050405090304" pitchFamily="18" charset="0"/>
@@ -7480,6 +7564,9 @@
             </a:pPr>
             <a:r>
               <a:rPr lang="en-US" sz="2900" dirty="0" smtClean="0">
+                <a:highlight>
+                  <a:srgbClr val="FFFF00"/>
+                </a:highlight>
                 <a:latin typeface="Times New Roman" panose="02020503050405090304" pitchFamily="18" charset="0"/>
                 <a:cs typeface="Times New Roman" panose="02020503050405090304" pitchFamily="18" charset="0"/>
               </a:rPr>
@@ -7487,12 +7574,18 @@
             </a:r>
             <a:r>
               <a:rPr lang="en-US" sz="2900" dirty="0">
+                <a:highlight>
+                  <a:srgbClr val="FFFF00"/>
+                </a:highlight>
                 <a:latin typeface="Times New Roman" panose="02020503050405090304" pitchFamily="18" charset="0"/>
                 <a:cs typeface="Times New Roman" panose="02020503050405090304" pitchFamily="18" charset="0"/>
               </a:rPr>
               <a:t>and subtraction are acceptable on the interval scale, but not multiplication and division </a:t>
             </a:r>
             <a:endParaRPr lang="en-US" sz="2900" dirty="0">
+              <a:highlight>
+                <a:srgbClr val="FFFF00"/>
+              </a:highlight>
               <a:latin typeface="Times New Roman" panose="02020503050405090304" pitchFamily="18" charset="0"/>
               <a:cs typeface="Times New Roman" panose="02020503050405090304" pitchFamily="18" charset="0"/>
             </a:endParaRPr>
@@ -7502,7 +7595,10 @@
               <a:buFont typeface="Wingdings" panose="05000000000000000000" pitchFamily="2" charset="2"/>
               <a:buChar char="§"/>
             </a:pPr>
-            <a:endParaRPr lang="en-US" sz="2000" dirty="0">
+            <a:endParaRPr lang="en-US" sz="2900" dirty="0">
+              <a:highlight>
+                <a:srgbClr val="FFFF00"/>
+              </a:highlight>
               <a:latin typeface="Times New Roman" panose="02020503050405090304" pitchFamily="18" charset="0"/>
               <a:cs typeface="Times New Roman" panose="02020503050405090304" pitchFamily="18" charset="0"/>
             </a:endParaRPr>
@@ -8001,10 +8097,23 @@
                     <a:latin typeface="Times New Roman" panose="02020503050405090304" pitchFamily="18" charset="0"/>
                     <a:cs typeface="Times New Roman" panose="02020503050405090304" pitchFamily="18" charset="0"/>
                   </a:rPr>
-                  <a:t> There </a:t>
+                  <a:t> </a:t>
+                </a:r>
+                <a:r>
+                  <a:rPr lang="en-US" dirty="0" smtClean="0">
+                    <a:highlight>
+                      <a:srgbClr val="FFFF00"/>
+                    </a:highlight>
+                    <a:latin typeface="Times New Roman" panose="02020503050405090304" pitchFamily="18" charset="0"/>
+                    <a:cs typeface="Times New Roman" panose="02020503050405090304" pitchFamily="18" charset="0"/>
+                  </a:rPr>
+                  <a:t>There </a:t>
                 </a:r>
                 <a:r>
                   <a:rPr lang="en-US" dirty="0">
+                    <a:highlight>
+                      <a:srgbClr val="FFFF00"/>
+                    </a:highlight>
                     <a:latin typeface="Times New Roman" panose="02020503050405090304" pitchFamily="18" charset="0"/>
                     <a:cs typeface="Times New Roman" panose="02020503050405090304" pitchFamily="18" charset="0"/>
                   </a:rPr>
@@ -8029,6 +8138,9 @@
                 </a:r>
                 <a:r>
                   <a:rPr lang="en-US" dirty="0" smtClean="0">
+                    <a:highlight>
+                      <a:srgbClr val="FFFF00"/>
+                    </a:highlight>
                     <a:latin typeface="Times New Roman" panose="02020503050405090304" pitchFamily="18" charset="0"/>
                     <a:cs typeface="Times New Roman" panose="02020503050405090304" pitchFamily="18" charset="0"/>
                   </a:rPr>
@@ -8036,6 +8148,9 @@
                 </a:r>
                 <a:r>
                   <a:rPr lang="en-US" dirty="0">
+                    <a:highlight>
+                      <a:srgbClr val="FFFF00"/>
+                    </a:highlight>
                     <a:latin typeface="Times New Roman" panose="02020503050405090304" pitchFamily="18" charset="0"/>
                     <a:cs typeface="Times New Roman" panose="02020503050405090304" pitchFamily="18" charset="0"/>
                   </a:rPr>
@@ -8043,6 +8158,9 @@
                 </a:r>
                 <a:r>
                   <a:rPr lang="en-US" dirty="0" smtClean="0">
+                    <a:highlight>
+                      <a:srgbClr val="FFFF00"/>
+                    </a:highlight>
                     <a:latin typeface="Times New Roman" panose="02020503050405090304" pitchFamily="18" charset="0"/>
                     <a:cs typeface="Times New Roman" panose="02020503050405090304" pitchFamily="18" charset="0"/>
                   </a:rPr>
@@ -8050,12 +8168,18 @@
                 </a:r>
                 <a:r>
                   <a:rPr lang="en-US" dirty="0">
+                    <a:highlight>
+                      <a:srgbClr val="FFFF00"/>
+                    </a:highlight>
                     <a:latin typeface="Times New Roman" panose="02020503050405090304" pitchFamily="18" charset="0"/>
                     <a:cs typeface="Times New Roman" panose="02020503050405090304" pitchFamily="18" charset="0"/>
                   </a:rPr>
                   <a:t>, known as units.</a:t>
                 </a:r>
                 <a:endParaRPr lang="en-US" dirty="0">
+                  <a:highlight>
+                    <a:srgbClr val="FFFF00"/>
+                  </a:highlight>
                   <a:latin typeface="Times New Roman" panose="02020503050405090304" pitchFamily="18" charset="0"/>
                   <a:cs typeface="Times New Roman" panose="02020503050405090304" pitchFamily="18" charset="0"/>
                 </a:endParaRPr>
@@ -8074,6 +8198,9 @@
                 </a:r>
                 <a:r>
                   <a:rPr lang="en-US" dirty="0" smtClean="0">
+                    <a:highlight>
+                      <a:srgbClr val="FFFF00"/>
+                    </a:highlight>
                     <a:latin typeface="Times New Roman" panose="02020503050405090304" pitchFamily="18" charset="0"/>
                     <a:cs typeface="Times New Roman" panose="02020503050405090304" pitchFamily="18" charset="0"/>
                   </a:rPr>
@@ -8081,10 +8208,20 @@
                 </a:r>
                 <a:r>
                   <a:rPr lang="en-US" dirty="0">
+                    <a:highlight>
+                      <a:srgbClr val="FFFF00"/>
+                    </a:highlight>
                     <a:latin typeface="Times New Roman" panose="02020503050405090304" pitchFamily="18" charset="0"/>
                     <a:cs typeface="Times New Roman" panose="02020503050405090304" pitchFamily="18" charset="0"/>
                   </a:rPr>
-                  <a:t>arithmetic can be meaningfully applied to the classes in </a:t>
+                  <a:t>arithmetic can be meaningfully applied </a:t>
+                </a:r>
+                <a:r>
+                  <a:rPr lang="en-US" dirty="0">
+                    <a:latin typeface="Times New Roman" panose="02020503050405090304" pitchFamily="18" charset="0"/>
+                    <a:cs typeface="Times New Roman" panose="02020503050405090304" pitchFamily="18" charset="0"/>
+                  </a:rPr>
+                  <a:t>to the classes in </a:t>
                 </a:r>
                 <a:r>
                   <a:rPr lang="en-US" dirty="0" smtClean="0">
@@ -8157,28 +8294,49 @@
                       <a:rPr lang="en-US" b="0" i="1" smtClean="0">
                         <a:latin typeface="Cambria Math" panose="02040503050406030204" pitchFamily="18" charset="0"/>
                       </a:rPr>
-                      <m:t>                                                </m:t>
+                      <m:t>                                           </m:t>
                     </m:r>
                     <m:r>
                       <a:rPr lang="en-US" b="0" i="1" smtClean="0">
+                        <a:highlight>
+                          <a:srgbClr val="FFFF00"/>
+                        </a:highlight>
+                        <a:latin typeface="Cambria Math" panose="02040503050406030204" pitchFamily="18" charset="0"/>
+                      </a:rPr>
+                      <m:t>     </m:t>
+                    </m:r>
+                    <m:r>
+                      <a:rPr lang="en-US" b="0" i="1" smtClean="0">
+                        <a:highlight>
+                          <a:srgbClr val="FFFF00"/>
+                        </a:highlight>
                         <a:latin typeface="Cambria Math" panose="02040503050406030204" pitchFamily="18" charset="0"/>
                       </a:rPr>
                       <m:t>𝑀</m:t>
                     </m:r>
                     <m:r>
                       <a:rPr lang="en-US" b="0" i="1" smtClean="0">
+                        <a:highlight>
+                          <a:srgbClr val="FFFF00"/>
+                        </a:highlight>
                         <a:latin typeface="Cambria Math" panose="02040503050406030204" pitchFamily="18" charset="0"/>
                       </a:rPr>
                       <m:t>=</m:t>
                     </m:r>
                     <m:r>
                       <a:rPr lang="en-US" b="0" i="1" smtClean="0">
+                        <a:highlight>
+                          <a:srgbClr val="FFFF00"/>
+                        </a:highlight>
                         <a:latin typeface="Cambria Math" panose="02040503050406030204" pitchFamily="18" charset="0"/>
                       </a:rPr>
                       <m:t>𝑎𝑀</m:t>
                     </m:r>
                     <m:r>
                       <a:rPr lang="en-US" b="0" i="1" smtClean="0">
+                        <a:highlight>
+                          <a:srgbClr val="FFFF00"/>
+                        </a:highlight>
                         <a:latin typeface="Cambria Math" panose="02040503050406030204" pitchFamily="18" charset="0"/>
                       </a:rPr>
                       <m:t>′</m:t>
@@ -8354,7 +8512,24 @@
                 <a:latin typeface="Times New Roman" panose="02020503050405090304" pitchFamily="18" charset="0"/>
                 <a:cs typeface="Times New Roman" panose="02020503050405090304" pitchFamily="18" charset="0"/>
               </a:rPr>
-              <a:t>absolute scale is the most restrictive of </a:t>
+              <a:t>absolute scale is the </a:t>
+            </a:r>
+            <a:r>
+              <a:rPr lang="en-US" sz="2400" dirty="0">
+                <a:highlight>
+                  <a:srgbClr val="FFFF00"/>
+                </a:highlight>
+                <a:latin typeface="Times New Roman" panose="02020503050405090304" pitchFamily="18" charset="0"/>
+                <a:cs typeface="Times New Roman" panose="02020503050405090304" pitchFamily="18" charset="0"/>
+              </a:rPr>
+              <a:t>most restrictive</a:t>
+            </a:r>
+            <a:r>
+              <a:rPr lang="en-US" sz="2400" dirty="0">
+                <a:latin typeface="Times New Roman" panose="02020503050405090304" pitchFamily="18" charset="0"/>
+                <a:cs typeface="Times New Roman" panose="02020503050405090304" pitchFamily="18" charset="0"/>
+              </a:rPr>
+              <a:t> of </a:t>
             </a:r>
             <a:r>
               <a:rPr lang="en-US" sz="2400" dirty="0" smtClean="0">
@@ -8407,12 +8582,18 @@
             </a:r>
             <a:r>
               <a:rPr lang="en-US" sz="2400" i="1" dirty="0">
+                <a:highlight>
+                  <a:srgbClr val="FFFF00"/>
+                </a:highlight>
                 <a:latin typeface="Times New Roman" panose="02020503050405090304" pitchFamily="18" charset="0"/>
                 <a:cs typeface="Times New Roman" panose="02020503050405090304" pitchFamily="18" charset="0"/>
               </a:rPr>
               <a:t>the identity transformation.</a:t>
             </a:r>
             <a:endParaRPr lang="en-US" sz="2400" i="1" dirty="0">
+              <a:highlight>
+                <a:srgbClr val="FFFF00"/>
+              </a:highlight>
               <a:latin typeface="Times New Roman" panose="02020503050405090304" pitchFamily="18" charset="0"/>
               <a:cs typeface="Times New Roman" panose="02020503050405090304" pitchFamily="18" charset="0"/>
             </a:endParaRPr>

</xml_diff>